<commit_message>
Update diagrams and Q3 answer
</commit_message>
<xml_diff>
--- a/Diagrams.pptx
+++ b/Diagrams.pptx
@@ -3344,6 +3344,58 @@
       </p:grpSpPr>
       <p:sp>
         <p:nvSpPr>
+          <p:cNvPr id="77" name="Rectangle 76">
+            <a:extLst>
+              <a:ext uri="{FF2B5EF4-FFF2-40B4-BE49-F238E27FC236}">
+                <a16:creationId xmlns:a16="http://schemas.microsoft.com/office/drawing/2014/main" id="{34CF4FD0-25BE-10FF-89A6-C6A49B27802B}"/>
+              </a:ext>
+            </a:extLst>
+          </p:cNvPr>
+          <p:cNvSpPr/>
+          <p:nvPr/>
+        </p:nvSpPr>
+        <p:spPr>
+          <a:xfrm>
+            <a:off x="0" y="0"/>
+            <a:ext cx="12192000" cy="6858000"/>
+          </a:xfrm>
+          <a:prstGeom prst="rect">
+            <a:avLst/>
+          </a:prstGeom>
+          <a:solidFill>
+            <a:schemeClr val="bg1"/>
+          </a:solidFill>
+          <a:ln>
+            <a:noFill/>
+          </a:ln>
+        </p:spPr>
+        <p:style>
+          <a:lnRef idx="2">
+            <a:schemeClr val="accent1">
+              <a:shade val="50000"/>
+            </a:schemeClr>
+          </a:lnRef>
+          <a:fillRef idx="1">
+            <a:schemeClr val="accent1"/>
+          </a:fillRef>
+          <a:effectRef idx="0">
+            <a:schemeClr val="accent1"/>
+          </a:effectRef>
+          <a:fontRef idx="minor">
+            <a:schemeClr val="lt1"/>
+          </a:fontRef>
+        </p:style>
+        <p:txBody>
+          <a:bodyPr rtlCol="0" anchor="ctr"/>
+          <a:lstStyle/>
+          <a:p>
+            <a:pPr algn="ctr"/>
+            <a:endParaRPr lang="en-US"/>
+          </a:p>
+        </p:txBody>
+      </p:sp>
+      <p:sp>
+        <p:nvSpPr>
           <p:cNvPr id="4" name="TextBox 3">
             <a:extLst>
               <a:ext uri="{FF2B5EF4-FFF2-40B4-BE49-F238E27FC236}">
@@ -3356,8 +3408,8 @@
         </p:nvSpPr>
         <p:spPr>
           <a:xfrm>
-            <a:off x="1062293" y="896580"/>
-            <a:ext cx="2183611" cy="523220"/>
+            <a:off x="354098" y="896580"/>
+            <a:ext cx="3600000" cy="523220"/>
           </a:xfrm>
           <a:prstGeom prst="rect">
             <a:avLst/>
@@ -3396,8 +3448,8 @@
         </p:nvSpPr>
         <p:spPr>
           <a:xfrm>
-            <a:off x="4777420" y="896580"/>
-            <a:ext cx="2743060" cy="523220"/>
+            <a:off x="4296000" y="896580"/>
+            <a:ext cx="3600000" cy="523220"/>
           </a:xfrm>
           <a:prstGeom prst="rect">
             <a:avLst/>
@@ -4551,8 +4603,8 @@
         </p:nvSpPr>
         <p:spPr>
           <a:xfrm>
-            <a:off x="8702589" y="896580"/>
-            <a:ext cx="3001143" cy="523220"/>
+            <a:off x="8237903" y="896580"/>
+            <a:ext cx="3600000" cy="523220"/>
           </a:xfrm>
           <a:prstGeom prst="rect">
             <a:avLst/>

</xml_diff>